<commit_message>
Finished refactoring, and fixed bug, where max permitted overlap should always be the constant value 2.
</commit_message>
<xml_diff>
--- a/docs/aaa-explainer.pptx
+++ b/docs/aaa-explainer.pptx
@@ -16,6 +16,7 @@
     <p:sldId id="263" r:id="rId10"/>
     <p:sldId id="264" r:id="rId11"/>
     <p:sldId id="265" r:id="rId12"/>
+    <p:sldId id="267" r:id="rId13"/>
   </p:sldIdLst>
   <p:sldSz cx="12192000" cy="6858000"/>
   <p:notesSz cx="6858000" cy="9144000"/>
@@ -114,6 +115,11 @@
       </a:defRPr>
     </a:lvl9pPr>
   </p:defaultTextStyle>
+  <p:extLst>
+    <p:ext uri="{EFAFB233-063F-42B5-8137-9DF3F51BA10A}">
+      <p15:sldGuideLst xmlns:p15="http://schemas.microsoft.com/office/powerpoint/2012/main"/>
+    </p:ext>
+  </p:extLst>
 </p:presentation>
 </file>
 
@@ -270,7 +276,7 @@
           <a:p>
             <a:fld id="{C60B2A5C-0759-4488-B2C4-E58DF70B5AAF}" type="datetimeFigureOut">
               <a:rPr lang="en-GB" smtClean="0"/>
-              <a:t>15/11/2017</a:t>
+              <a:t>19/11/2017</a:t>
             </a:fld>
             <a:endParaRPr lang="en-GB"/>
           </a:p>
@@ -470,7 +476,7 @@
           <a:p>
             <a:fld id="{C60B2A5C-0759-4488-B2C4-E58DF70B5AAF}" type="datetimeFigureOut">
               <a:rPr lang="en-GB" smtClean="0"/>
-              <a:t>15/11/2017</a:t>
+              <a:t>19/11/2017</a:t>
             </a:fld>
             <a:endParaRPr lang="en-GB"/>
           </a:p>
@@ -680,7 +686,7 @@
           <a:p>
             <a:fld id="{C60B2A5C-0759-4488-B2C4-E58DF70B5AAF}" type="datetimeFigureOut">
               <a:rPr lang="en-GB" smtClean="0"/>
-              <a:t>15/11/2017</a:t>
+              <a:t>19/11/2017</a:t>
             </a:fld>
             <a:endParaRPr lang="en-GB"/>
           </a:p>
@@ -880,7 +886,7 @@
           <a:p>
             <a:fld id="{C60B2A5C-0759-4488-B2C4-E58DF70B5AAF}" type="datetimeFigureOut">
               <a:rPr lang="en-GB" smtClean="0"/>
-              <a:t>15/11/2017</a:t>
+              <a:t>19/11/2017</a:t>
             </a:fld>
             <a:endParaRPr lang="en-GB"/>
           </a:p>
@@ -1156,7 +1162,7 @@
           <a:p>
             <a:fld id="{C60B2A5C-0759-4488-B2C4-E58DF70B5AAF}" type="datetimeFigureOut">
               <a:rPr lang="en-GB" smtClean="0"/>
-              <a:t>15/11/2017</a:t>
+              <a:t>19/11/2017</a:t>
             </a:fld>
             <a:endParaRPr lang="en-GB"/>
           </a:p>
@@ -1424,7 +1430,7 @@
           <a:p>
             <a:fld id="{C60B2A5C-0759-4488-B2C4-E58DF70B5AAF}" type="datetimeFigureOut">
               <a:rPr lang="en-GB" smtClean="0"/>
-              <a:t>15/11/2017</a:t>
+              <a:t>19/11/2017</a:t>
             </a:fld>
             <a:endParaRPr lang="en-GB"/>
           </a:p>
@@ -1839,7 +1845,7 @@
           <a:p>
             <a:fld id="{C60B2A5C-0759-4488-B2C4-E58DF70B5AAF}" type="datetimeFigureOut">
               <a:rPr lang="en-GB" smtClean="0"/>
-              <a:t>15/11/2017</a:t>
+              <a:t>19/11/2017</a:t>
             </a:fld>
             <a:endParaRPr lang="en-GB"/>
           </a:p>
@@ -1981,7 +1987,7 @@
           <a:p>
             <a:fld id="{C60B2A5C-0759-4488-B2C4-E58DF70B5AAF}" type="datetimeFigureOut">
               <a:rPr lang="en-GB" smtClean="0"/>
-              <a:t>15/11/2017</a:t>
+              <a:t>19/11/2017</a:t>
             </a:fld>
             <a:endParaRPr lang="en-GB"/>
           </a:p>
@@ -2094,7 +2100,7 @@
           <a:p>
             <a:fld id="{C60B2A5C-0759-4488-B2C4-E58DF70B5AAF}" type="datetimeFigureOut">
               <a:rPr lang="en-GB" smtClean="0"/>
-              <a:t>15/11/2017</a:t>
+              <a:t>19/11/2017</a:t>
             </a:fld>
             <a:endParaRPr lang="en-GB"/>
           </a:p>
@@ -2407,7 +2413,7 @@
           <a:p>
             <a:fld id="{C60B2A5C-0759-4488-B2C4-E58DF70B5AAF}" type="datetimeFigureOut">
               <a:rPr lang="en-GB" smtClean="0"/>
-              <a:t>15/11/2017</a:t>
+              <a:t>19/11/2017</a:t>
             </a:fld>
             <a:endParaRPr lang="en-GB"/>
           </a:p>
@@ -2696,7 +2702,7 @@
           <a:p>
             <a:fld id="{C60B2A5C-0759-4488-B2C4-E58DF70B5AAF}" type="datetimeFigureOut">
               <a:rPr lang="en-GB" smtClean="0"/>
-              <a:t>15/11/2017</a:t>
+              <a:t>19/11/2017</a:t>
             </a:fld>
             <a:endParaRPr lang="en-GB"/>
           </a:p>
@@ -2939,7 +2945,7 @@
           <a:p>
             <a:fld id="{C60B2A5C-0759-4488-B2C4-E58DF70B5AAF}" type="datetimeFigureOut">
               <a:rPr lang="en-GB" smtClean="0"/>
-              <a:t>15/11/2017</a:t>
+              <a:t>19/11/2017</a:t>
             </a:fld>
             <a:endParaRPr lang="en-GB"/>
           </a:p>
@@ -3418,7 +3424,7 @@
           <a:p>
             <a:r>
               <a:rPr lang="en-GB" dirty="0"/>
-              <a:t>Thursday 16</a:t>
+              <a:t>Thursday 19</a:t>
             </a:r>
             <a:r>
               <a:rPr lang="en-GB" baseline="30000" dirty="0"/>
@@ -3504,7 +3510,7 @@
         <p:spPr>
           <a:xfrm>
             <a:off x="918099" y="1690688"/>
-            <a:ext cx="8763000" cy="4247317"/>
+            <a:ext cx="8763000" cy="3970318"/>
           </a:xfrm>
           <a:prstGeom prst="rect">
             <a:avLst/>
@@ -3575,21 +3581,7 @@
                   <a:prstClr val="black"/>
                 </a:solidFill>
               </a:rPr>
-              <a:t>needs to be updated a bit to catch up with a few points mentioned in this PPT</a:t>
-            </a:r>
-          </a:p>
-          <a:p>
-            <a:pPr marL="742950" lvl="1" indent="-285750">
-              <a:buFont typeface="Arial" panose="020B0604020202020204" pitchFamily="34" charset="0"/>
-              <a:buChar char="•"/>
-            </a:pPr>
-            <a:r>
-              <a:rPr lang="en-GB" dirty="0">
-                <a:solidFill>
-                  <a:prstClr val="black"/>
-                </a:solidFill>
-              </a:rPr>
-              <a:t>has problematic runtimes for large enough numbers.</a:t>
+              <a:t>Is annoying slow for large enough numbers.</a:t>
             </a:r>
           </a:p>
           <a:p>
@@ -3726,7 +3718,7 @@
         <p:spPr>
           <a:xfrm>
             <a:off x="900344" y="1868241"/>
-            <a:ext cx="8763000" cy="4247317"/>
+            <a:ext cx="8763000" cy="3416320"/>
           </a:xfrm>
           <a:prstGeom prst="rect">
             <a:avLst/>
@@ -3740,7 +3732,7 @@
           <a:lstStyle/>
           <a:p>
             <a:r>
-              <a:rPr lang="en-GB" dirty="0">
+              <a:rPr lang="en-GB" strike="sngStrike" dirty="0">
                 <a:solidFill>
                   <a:prstClr val="black"/>
                 </a:solidFill>
@@ -3749,7 +3741,7 @@
             </a:r>
           </a:p>
           <a:p>
-            <a:endParaRPr lang="en-GB" dirty="0">
+            <a:endParaRPr lang="en-GB" strike="sngStrike" dirty="0">
               <a:solidFill>
                 <a:prstClr val="black"/>
               </a:solidFill>
@@ -3757,7 +3749,7 @@
           </a:p>
           <a:p>
             <a:r>
-              <a:rPr lang="en-GB" dirty="0">
+              <a:rPr lang="en-GB" strike="sngStrike" dirty="0">
                 <a:solidFill>
                   <a:prstClr val="black"/>
                 </a:solidFill>
@@ -3766,7 +3758,7 @@
             </a:r>
           </a:p>
           <a:p>
-            <a:endParaRPr lang="en-GB" dirty="0">
+            <a:endParaRPr lang="en-GB" strike="sngStrike" dirty="0">
               <a:solidFill>
                 <a:prstClr val="black"/>
               </a:solidFill>
@@ -3774,7 +3766,7 @@
           </a:p>
           <a:p>
             <a:r>
-              <a:rPr lang="en-GB" dirty="0">
+              <a:rPr lang="en-GB" strike="sngStrike" dirty="0">
                 <a:solidFill>
                   <a:prstClr val="black"/>
                 </a:solidFill>
@@ -3799,6 +3791,216 @@
               <a:t>In the meantime, I have briefed an expert mathematician Chris Tofts, and he’s coming to help us Monday.</a:t>
             </a:r>
           </a:p>
+        </p:txBody>
+      </p:sp>
+      <p:sp>
+        <p:nvSpPr>
+          <p:cNvPr id="3" name="TextBox 2">
+            <a:extLst>
+              <a:ext uri="{FF2B5EF4-FFF2-40B4-BE49-F238E27FC236}">
+                <a16:creationId xmlns:a16="http://schemas.microsoft.com/office/drawing/2014/main" id="{F86CF3C8-C554-4EDB-89CE-121236FD77A2}"/>
+              </a:ext>
+            </a:extLst>
+          </p:cNvPr>
+          <p:cNvSpPr txBox="1"/>
+          <p:nvPr/>
+        </p:nvSpPr>
+        <p:spPr>
+          <a:xfrm rot="1269259">
+            <a:off x="8790388" y="3007685"/>
+            <a:ext cx="3062570" cy="369332"/>
+          </a:xfrm>
+          <a:prstGeom prst="rect">
+            <a:avLst/>
+          </a:prstGeom>
+          <a:noFill/>
+        </p:spPr>
+        <p:txBody>
+          <a:bodyPr wrap="none" rtlCol="0">
+            <a:spAutoFit/>
+          </a:bodyPr>
+          <a:lstStyle/>
+          <a:p>
+            <a:r>
+              <a:rPr lang="en-GB" dirty="0">
+                <a:solidFill>
+                  <a:srgbClr val="FF0000"/>
+                </a:solidFill>
+              </a:rPr>
+              <a:t>Logic turns out to be flawed </a:t>
+            </a:r>
+            <a:r>
+              <a:rPr lang="en-GB" dirty="0">
+                <a:solidFill>
+                  <a:srgbClr val="FF0000"/>
+                </a:solidFill>
+                <a:sym typeface="Wingdings" panose="05000000000000000000" pitchFamily="2" charset="2"/>
+              </a:rPr>
+              <a:t></a:t>
+            </a:r>
+            <a:endParaRPr lang="en-GB" dirty="0">
+              <a:solidFill>
+                <a:srgbClr val="FF0000"/>
+              </a:solidFill>
+            </a:endParaRPr>
+          </a:p>
+        </p:txBody>
+      </p:sp>
+    </p:spTree>
+    <p:extLst>
+      <p:ext uri="{BB962C8B-B14F-4D97-AF65-F5344CB8AC3E}">
+        <p14:creationId xmlns:p14="http://schemas.microsoft.com/office/powerpoint/2010/main" val="676687270"/>
+      </p:ext>
+    </p:extLst>
+  </p:cSld>
+  <p:clrMapOvr>
+    <a:masterClrMapping/>
+  </p:clrMapOvr>
+</p:sld>
+</file>
+
+<file path=ppt/slides/slide12.xml><?xml version="1.0" encoding="utf-8"?>
+<p:sld xmlns:a="http://schemas.openxmlformats.org/drawingml/2006/main" xmlns:r="http://schemas.openxmlformats.org/officeDocument/2006/relationships" xmlns:p="http://schemas.openxmlformats.org/presentationml/2006/main">
+  <p:cSld>
+    <p:spTree>
+      <p:nvGrpSpPr>
+        <p:cNvPr id="1" name=""/>
+        <p:cNvGrpSpPr/>
+        <p:nvPr/>
+      </p:nvGrpSpPr>
+      <p:grpSpPr>
+        <a:xfrm>
+          <a:off x="0" y="0"/>
+          <a:ext cx="0" cy="0"/>
+          <a:chOff x="0" y="0"/>
+          <a:chExt cx="0" cy="0"/>
+        </a:xfrm>
+      </p:grpSpPr>
+      <p:sp>
+        <p:nvSpPr>
+          <p:cNvPr id="2" name="Title 1">
+            <a:extLst>
+              <a:ext uri="{FF2B5EF4-FFF2-40B4-BE49-F238E27FC236}">
+                <a16:creationId xmlns:a16="http://schemas.microsoft.com/office/drawing/2014/main" id="{5106F318-82E0-443D-9A87-3ECF7C0EFC7C}"/>
+              </a:ext>
+            </a:extLst>
+          </p:cNvPr>
+          <p:cNvSpPr>
+            <a:spLocks noGrp="1"/>
+          </p:cNvSpPr>
+          <p:nvPr>
+            <p:ph type="title"/>
+          </p:nvPr>
+        </p:nvSpPr>
+        <p:spPr/>
+        <p:txBody>
+          <a:bodyPr/>
+          <a:lstStyle/>
+          <a:p>
+            <a:r>
+              <a:rPr lang="en-GB" dirty="0"/>
+              <a:t>Next Steps</a:t>
+            </a:r>
+          </a:p>
+        </p:txBody>
+      </p:sp>
+      <p:sp>
+        <p:nvSpPr>
+          <p:cNvPr id="7" name="TextBox 6">
+            <a:extLst>
+              <a:ext uri="{FF2B5EF4-FFF2-40B4-BE49-F238E27FC236}">
+                <a16:creationId xmlns:a16="http://schemas.microsoft.com/office/drawing/2014/main" id="{9406A62C-3320-4EBB-8246-3AB67D5CAC60}"/>
+              </a:ext>
+            </a:extLst>
+          </p:cNvPr>
+          <p:cNvSpPr txBox="1"/>
+          <p:nvPr/>
+        </p:nvSpPr>
+        <p:spPr>
+          <a:xfrm>
+            <a:off x="900344" y="1868241"/>
+            <a:ext cx="8763000" cy="1754326"/>
+          </a:xfrm>
+          <a:prstGeom prst="rect">
+            <a:avLst/>
+          </a:prstGeom>
+          <a:noFill/>
+        </p:spPr>
+        <p:txBody>
+          <a:bodyPr wrap="square" rtlCol="0">
+            <a:spAutoFit/>
+          </a:bodyPr>
+          <a:lstStyle/>
+          <a:p>
+            <a:pPr marL="285750" indent="-285750">
+              <a:buFont typeface="Arial" panose="020B0604020202020204" pitchFamily="34" charset="0"/>
+              <a:buChar char="•"/>
+            </a:pPr>
+            <a:r>
+              <a:rPr lang="en-GB" dirty="0">
+                <a:solidFill>
+                  <a:prstClr val="black"/>
+                </a:solidFill>
+              </a:rPr>
+              <a:t>Re-run the DOE with the corrected code – with more / denser points.</a:t>
+            </a:r>
+          </a:p>
+          <a:p>
+            <a:pPr marL="285750" indent="-285750">
+              <a:buFont typeface="Arial" panose="020B0604020202020204" pitchFamily="34" charset="0"/>
+              <a:buChar char="•"/>
+            </a:pPr>
+            <a:r>
+              <a:rPr lang="en-GB" dirty="0">
+                <a:solidFill>
+                  <a:prstClr val="black"/>
+                </a:solidFill>
+              </a:rPr>
+              <a:t>Represent the DOE with a plot(s)</a:t>
+            </a:r>
+          </a:p>
+          <a:p>
+            <a:pPr marL="285750" indent="-285750">
+              <a:buFont typeface="Arial" panose="020B0604020202020204" pitchFamily="34" charset="0"/>
+              <a:buChar char="•"/>
+            </a:pPr>
+            <a:r>
+              <a:rPr lang="en-GB" dirty="0">
+                <a:solidFill>
+                  <a:prstClr val="black"/>
+                </a:solidFill>
+              </a:rPr>
+              <a:t>Make it so you can use real assay names and don’t-mix rules and get a report.</a:t>
+            </a:r>
+          </a:p>
+          <a:p>
+            <a:pPr marL="285750" indent="-285750">
+              <a:buFont typeface="Arial" panose="020B0604020202020204" pitchFamily="34" charset="0"/>
+              <a:buChar char="•"/>
+            </a:pPr>
+            <a:r>
+              <a:rPr lang="en-GB" dirty="0">
+                <a:solidFill>
+                  <a:prstClr val="black"/>
+                </a:solidFill>
+              </a:rPr>
+              <a:t>Peer scrutiny of the assumptions and logic</a:t>
+            </a:r>
+          </a:p>
+          <a:p>
+            <a:pPr marL="285750" indent="-285750">
+              <a:buFont typeface="Arial" panose="020B0604020202020204" pitchFamily="34" charset="0"/>
+              <a:buChar char="•"/>
+            </a:pPr>
+            <a:r>
+              <a:rPr lang="en-GB" dirty="0">
+                <a:solidFill>
+                  <a:prstClr val="black"/>
+                </a:solidFill>
+              </a:rPr>
+              <a:t>Scrutiny of how to exploit failure-mode probabilities and external info like DAC test.</a:t>
+            </a:r>
+          </a:p>
           <a:p>
             <a:endParaRPr lang="en-GB" dirty="0">
               <a:solidFill>
@@ -3806,22 +4008,12 @@
               </a:solidFill>
             </a:endParaRPr>
           </a:p>
-          <a:p>
-            <a:r>
-              <a:rPr lang="en-GB" dirty="0">
-                <a:solidFill>
-                  <a:prstClr val="black"/>
-                </a:solidFill>
-              </a:rPr>
-              <a:t>And unless I get this math model working fairly quickly, I’ll fix up the existing software and set it running to at least begin to give us some trade off design points to consider.</a:t>
-            </a:r>
-          </a:p>
         </p:txBody>
       </p:sp>
     </p:spTree>
     <p:extLst>
       <p:ext uri="{BB962C8B-B14F-4D97-AF65-F5344CB8AC3E}">
-        <p14:creationId xmlns:p14="http://schemas.microsoft.com/office/powerpoint/2010/main" val="676687270"/>
+        <p14:creationId xmlns:p14="http://schemas.microsoft.com/office/powerpoint/2010/main" val="800062594"/>
       </p:ext>
     </p:extLst>
   </p:cSld>
@@ -6263,7 +6455,7 @@
         <p:spPr>
           <a:xfrm>
             <a:off x="838200" y="1493293"/>
-            <a:ext cx="9016014" cy="4247317"/>
+            <a:ext cx="9016014" cy="3970318"/>
           </a:xfrm>
           <a:prstGeom prst="rect">
             <a:avLst/>
@@ -6278,19 +6470,7 @@
           <a:p>
             <a:r>
               <a:rPr lang="en-GB" b="1" dirty="0"/>
-              <a:t>The root cause is that the chamber sets intersect by 3 </a:t>
-            </a:r>
-            <a:r>
-              <a:rPr lang="en-GB" b="1" dirty="0">
-                <a:solidFill>
-                  <a:srgbClr val="FF0000"/>
-                </a:solidFill>
-              </a:rPr>
-              <a:t>(N)</a:t>
-            </a:r>
-            <a:r>
-              <a:rPr lang="en-GB" b="1" dirty="0"/>
-              <a:t> members: </a:t>
+              <a:t>The root cause is that the chamber sets intersect by 3 members: </a:t>
             </a:r>
             <a:r>
               <a:rPr lang="en-GB" dirty="0">
@@ -6315,15 +6495,15 @@
                   <a:prstClr val="black"/>
                 </a:solidFill>
               </a:rPr>
-              <a:t>Had the overlap been 2 </a:t>
+              <a:t>Had the overlap been </a:t>
             </a:r>
             <a:r>
               <a:rPr lang="en-GB" b="1" dirty="0">
                 <a:solidFill>
-                  <a:srgbClr val="FF0000"/>
+                  <a:prstClr val="black"/>
                 </a:solidFill>
               </a:rPr>
-              <a:t>(N-1)</a:t>
+              <a:t>2</a:t>
             </a:r>
             <a:r>
               <a:rPr lang="en-GB" dirty="0">
@@ -6335,6 +6515,74 @@
             </a:r>
           </a:p>
           <a:p>
+            <a:r>
+              <a:rPr lang="en-GB" dirty="0">
+                <a:solidFill>
+                  <a:prstClr val="black"/>
+                </a:solidFill>
+              </a:rPr>
+              <a:t>The overlap limit is always </a:t>
+            </a:r>
+            <a:r>
+              <a:rPr lang="en-GB" b="1" dirty="0">
+                <a:solidFill>
+                  <a:prstClr val="black"/>
+                </a:solidFill>
+              </a:rPr>
+              <a:t>2, </a:t>
+            </a:r>
+            <a:r>
+              <a:rPr lang="en-GB" dirty="0">
+                <a:solidFill>
+                  <a:prstClr val="black"/>
+                </a:solidFill>
+              </a:rPr>
+              <a:t>it is </a:t>
+            </a:r>
+            <a:r>
+              <a:rPr lang="en-GB" b="1" dirty="0">
+                <a:solidFill>
+                  <a:prstClr val="black"/>
+                </a:solidFill>
+              </a:rPr>
+              <a:t>not</a:t>
+            </a:r>
+            <a:r>
+              <a:rPr lang="en-GB" dirty="0">
+                <a:solidFill>
+                  <a:prstClr val="black"/>
+                </a:solidFill>
+              </a:rPr>
+              <a:t> connected with </a:t>
+            </a:r>
+            <a:r>
+              <a:rPr lang="en-GB" b="1" dirty="0">
+                <a:solidFill>
+                  <a:prstClr val="black"/>
+                </a:solidFill>
+              </a:rPr>
+              <a:t>N</a:t>
+            </a:r>
+            <a:r>
+              <a:rPr lang="en-GB" dirty="0">
+                <a:solidFill>
+                  <a:prstClr val="black"/>
+                </a:solidFill>
+              </a:rPr>
+              <a:t>.</a:t>
+            </a:r>
+          </a:p>
+          <a:p>
+            <a:r>
+              <a:rPr lang="en-GB" dirty="0">
+                <a:solidFill>
+                  <a:prstClr val="black"/>
+                </a:solidFill>
+              </a:rPr>
+              <a:t>You can work it through with for example N=4 (instead of 3), remembering this time to allocate 7 copies (N+3).</a:t>
+            </a:r>
+          </a:p>
+          <a:p>
             <a:endParaRPr lang="en-GB" dirty="0">
               <a:solidFill>
                 <a:prstClr val="black"/>
@@ -6358,7 +6606,23 @@
                   <a:prstClr val="black"/>
                 </a:solidFill>
               </a:rPr>
-              <a:t>After A has been allocated, we must purge from our pool of choices for B, any set in the pool that intersects with that used for A, by more than N-1.</a:t>
+              <a:t>After A has been allocated, we must purge from our pool of choices for B, any set in the pool that intersects with that used for A, by more than </a:t>
+            </a:r>
+            <a:r>
+              <a:rPr lang="en-GB" b="1" dirty="0">
+                <a:solidFill>
+                  <a:prstClr val="black"/>
+                </a:solidFill>
+              </a:rPr>
+              <a:t>2</a:t>
+            </a:r>
+            <a:r>
+              <a:rPr lang="en-GB" dirty="0">
+                <a:solidFill>
+                  <a:prstClr val="black"/>
+                </a:solidFill>
+              </a:rPr>
+              <a:t>.</a:t>
             </a:r>
           </a:p>
           <a:p>
@@ -6393,30 +6657,8 @@
                   <a:prstClr val="black"/>
                 </a:solidFill>
               </a:rPr>
-              <a:t>that used for any assay allocated prior to xxx, by more than N-1.</a:t>
-            </a:r>
-          </a:p>
-          <a:p>
-            <a:endParaRPr lang="en-GB" i="1" dirty="0">
-              <a:solidFill>
-                <a:prstClr val="black"/>
-              </a:solidFill>
-            </a:endParaRPr>
-          </a:p>
-          <a:p>
-            <a:r>
-              <a:rPr lang="en-GB" i="1" dirty="0">
-                <a:solidFill>
-                  <a:prstClr val="black"/>
-                </a:solidFill>
-              </a:rPr>
-              <a:t>Ps. This is more or less the how the current software tool works, except that it lags behind the thinking in this document a bit.  Because it preceded the malfunction resilience thinking. It only allocates N+1, and purges intersections larger than 1. (Very easy to upgrade).</a:t>
-            </a:r>
-            <a:endParaRPr lang="en-GB" dirty="0">
-              <a:solidFill>
-                <a:prstClr val="black"/>
-              </a:solidFill>
-            </a:endParaRPr>
+              <a:t>that used for any assay allocated prior to xxx, by more than 2.</a:t>
+            </a:r>
           </a:p>
         </p:txBody>
       </p:sp>

</xml_diff>